<commit_message>
Fix f-string prefix missing on email To: fields
</commit_message>
<xml_diff>
--- a/output/medforge/phi_positive/CaseStudy_0001.pptx
+++ b/output/medforge/phi_positive/CaseStudy_0001.pptx
@@ -3129,7 +3129,7 @@
           <a:lstStyle/>
           <a:p>
             <a:r>
-              <a:t>East Christy Clinic</a:t>
+              <a:t>Port Wanda Community Hospital</a:t>
             </a:r>
           </a:p>
           <a:p>
@@ -3222,23 +3222,23 @@
               <a:defRPr sz="1800"/>
             </a:pPr>
             <a:r>
-              <a:t>Patient: Tina White</a:t>
+              <a:t>Patient: Kevin Harrell</a:t>
             </a:r>
             <a:br/>
             <a:r>
-              <a:t>MRN: MRN396220</a:t>
+              <a:t>MRN: MRN825659</a:t>
             </a:r>
             <a:br/>
             <a:r>
-              <a:t>DOB: 07/11/2000 (Age: 25)</a:t>
+              <a:t>DOB: 04/13/1971 (Age: 54)</a:t>
             </a:r>
             <a:br/>
             <a:r>
-              <a:t>Contact: 319-922-1094 / jason26@example.com</a:t>
+              <a:t>Contact: 244-911-4891x3733 / ecole@example.net</a:t>
             </a:r>
             <a:br/>
             <a:r>
-              <a:t>Address: 90912 Walker Manor, South Andrew, MH</a:t>
+              <a:t>Address: 47283 Clark Stream, Stephenview, NY</a:t>
             </a:r>
           </a:p>
         </p:txBody>
@@ -3339,36 +3339,44 @@
             </a:r>
           </a:p>
           <a:p>
-            <a:pPr lvl="1">
-              <a:defRPr sz="1400"/>
-            </a:pPr>
-            <a:r>
-              <a:t>• Major Depressive Disorder (ICD-10: F33.1)</a:t>
-            </a:r>
-          </a:p>
-          <a:p>
-            <a:pPr lvl="1">
-              <a:defRPr sz="1400"/>
-            </a:pPr>
-            <a:r>
-              <a:t>• Osteoarthritis (ICD-10: M19.90)</a:t>
-            </a:r>
-          </a:p>
-          <a:p>
-            <a:pPr lvl="1">
-              <a:defRPr sz="1400"/>
-            </a:pPr>
-            <a:r>
-              <a:t>• Hyperlipidemia (ICD-10: E78.5)</a:t>
-            </a:r>
-          </a:p>
-          <a:p>
             <a:br/>
             <a:pPr>
               <a:defRPr b="1" sz="1600"/>
             </a:pPr>
             <a:r>
               <a:t>Current Medications:</a:t>
+            </a:r>
+          </a:p>
+          <a:p>
+            <a:pPr lvl="1">
+              <a:defRPr sz="1400"/>
+            </a:pPr>
+            <a:r>
+              <a:t>• Metformin 500mg twice daily</a:t>
+            </a:r>
+          </a:p>
+          <a:p>
+            <a:pPr lvl="1">
+              <a:defRPr sz="1400"/>
+            </a:pPr>
+            <a:r>
+              <a:t>• Atorvastatin 20mg daily</a:t>
+            </a:r>
+          </a:p>
+          <a:p>
+            <a:pPr lvl="1">
+              <a:defRPr sz="1400"/>
+            </a:pPr>
+            <a:r>
+              <a:t>• Amlodipine 5mg daily</a:t>
+            </a:r>
+          </a:p>
+          <a:p>
+            <a:pPr lvl="1">
+              <a:defRPr sz="1400"/>
+            </a:pPr>
+            <a:r>
+              <a:t>• Metoprolol 25mg twice daily</a:t>
             </a:r>
           </a:p>
           <a:p>
@@ -3464,31 +3472,31 @@
               <a:defRPr sz="2000"/>
             </a:pPr>
             <a:r>
-              <a:t>Blood Pressure: 139/94 mmHg</a:t>
+              <a:t>Blood Pressure: 157/85 mmHg</a:t>
             </a:r>
             <a:br/>
             <a:r>
-              <a:t>Heart Rate: 77 bpm</a:t>
+              <a:t>Heart Rate: 63 bpm</a:t>
             </a:r>
             <a:br/>
             <a:r>
-              <a:t>Temperature: 97.7°F</a:t>
+              <a:t>Temperature: 97.6°F</a:t>
             </a:r>
             <a:br/>
             <a:r>
-              <a:t>Respiratory Rate: 12</a:t>
+              <a:t>Respiratory Rate: 19</a:t>
             </a:r>
             <a:br/>
             <a:r>
-              <a:t>O2 Saturation: 96%</a:t>
+              <a:t>O2 Saturation: 97%</a:t>
             </a:r>
             <a:br/>
             <a:r>
-              <a:t>Weight: 153 lbs</a:t>
+              <a:t>Weight: 253 lbs</a:t>
             </a:r>
             <a:br/>
             <a:r>
-              <a:t>Height: 64 inches</a:t>
+              <a:t>Height: 72 inches</a:t>
             </a:r>
           </a:p>
         </p:txBody>
@@ -3576,11 +3584,11 @@
               <a:defRPr sz="1600"/>
             </a:pPr>
             <a:r>
-              <a:t>Patient under care of Andrew Morris, PA</a:t>
+              <a:t>Patient under care of Chad Schroeder, PA</a:t>
             </a:r>
             <a:br/>
             <a:r>
-              <a:t>Specialty: Endocrinology</a:t>
+              <a:t>Specialty: Neurology</a:t>
             </a:r>
             <a:br/>
             <a:br/>

</xml_diff>